<commit_message>
Presentation with Brief & Figma
More to be added
</commit_message>
<xml_diff>
--- a/Weekly Submissions/Week4/Presentation Week 4.pptx
+++ b/Weekly Submissions/Week4/Presentation Week 4.pptx
@@ -5,12 +5,15 @@
     <p:sldMasterId id="2147483672" r:id="rId1"/>
   </p:sldMasterIdLst>
   <p:notesMasterIdLst>
-    <p:notesMasterId r:id="rId5"/>
+    <p:notesMasterId r:id="rId8"/>
   </p:notesMasterIdLst>
   <p:sldIdLst>
     <p:sldId id="256" r:id="rId2"/>
     <p:sldId id="265" r:id="rId3"/>
-    <p:sldId id="264" r:id="rId4"/>
+    <p:sldId id="266" r:id="rId4"/>
+    <p:sldId id="267" r:id="rId5"/>
+    <p:sldId id="268" r:id="rId6"/>
+    <p:sldId id="264" r:id="rId7"/>
   </p:sldIdLst>
   <p:sldSz cx="9144000" cy="6858000" type="screen4x3"/>
   <p:notesSz cx="6858000" cy="9144000"/>
@@ -210,7 +213,7 @@
           <a:p>
             <a:fld id="{28EF27FA-D92E-4C57-9439-841474EE9BF9}" type="datetimeFigureOut">
               <a:rPr lang="en-GB" smtClean="0"/>
-              <a:t>11/10/2025</a:t>
+              <a:t>15/10/2025</a:t>
             </a:fld>
             <a:endParaRPr lang="en-GB"/>
           </a:p>
@@ -695,7 +698,7 @@
           <a:p>
             <a:fld id="{5BCAD085-E8A6-8845-BD4E-CB4CCA059FC4}" type="datetimeFigureOut">
               <a:rPr lang="en-US" smtClean="0"/>
-              <a:t>10/11/2025</a:t>
+              <a:t>10/15/2025</a:t>
             </a:fld>
             <a:endParaRPr lang="en-US"/>
           </a:p>
@@ -982,7 +985,7 @@
           <a:p>
             <a:fld id="{5BCAD085-E8A6-8845-BD4E-CB4CCA059FC4}" type="datetimeFigureOut">
               <a:rPr lang="en-US" smtClean="0"/>
-              <a:t>10/11/2025</a:t>
+              <a:t>10/15/2025</a:t>
             </a:fld>
             <a:endParaRPr lang="en-US"/>
           </a:p>
@@ -1174,7 +1177,7 @@
           <a:p>
             <a:fld id="{5BCAD085-E8A6-8845-BD4E-CB4CCA059FC4}" type="datetimeFigureOut">
               <a:rPr lang="en-US" smtClean="0"/>
-              <a:t>10/11/2025</a:t>
+              <a:t>10/15/2025</a:t>
             </a:fld>
             <a:endParaRPr lang="en-US"/>
           </a:p>
@@ -1435,7 +1438,7 @@
           <a:p>
             <a:fld id="{5BCAD085-E8A6-8845-BD4E-CB4CCA059FC4}" type="datetimeFigureOut">
               <a:rPr lang="en-US" smtClean="0"/>
-              <a:t>10/11/2025</a:t>
+              <a:t>10/15/2025</a:t>
             </a:fld>
             <a:endParaRPr lang="en-US"/>
           </a:p>
@@ -1859,7 +1862,7 @@
           <a:p>
             <a:fld id="{5BCAD085-E8A6-8845-BD4E-CB4CCA059FC4}" type="datetimeFigureOut">
               <a:rPr lang="en-US" smtClean="0"/>
-              <a:t>10/11/2025</a:t>
+              <a:t>10/15/2025</a:t>
             </a:fld>
             <a:endParaRPr lang="en-US"/>
           </a:p>
@@ -2405,7 +2408,7 @@
           <a:p>
             <a:fld id="{5BCAD085-E8A6-8845-BD4E-CB4CCA059FC4}" type="datetimeFigureOut">
               <a:rPr lang="en-US" smtClean="0"/>
-              <a:t>10/11/2025</a:t>
+              <a:t>10/15/2025</a:t>
             </a:fld>
             <a:endParaRPr lang="en-US"/>
           </a:p>
@@ -3245,7 +3248,7 @@
           <a:p>
             <a:fld id="{5BCAD085-E8A6-8845-BD4E-CB4CCA059FC4}" type="datetimeFigureOut">
               <a:rPr lang="en-US" smtClean="0"/>
-              <a:t>10/11/2025</a:t>
+              <a:t>10/15/2025</a:t>
             </a:fld>
             <a:endParaRPr lang="en-US"/>
           </a:p>
@@ -3415,7 +3418,7 @@
           <a:p>
             <a:fld id="{5BCAD085-E8A6-8845-BD4E-CB4CCA059FC4}" type="datetimeFigureOut">
               <a:rPr lang="en-US" smtClean="0"/>
-              <a:t>10/11/2025</a:t>
+              <a:t>10/15/2025</a:t>
             </a:fld>
             <a:endParaRPr lang="en-US"/>
           </a:p>
@@ -3599,7 +3602,7 @@
           <a:p>
             <a:fld id="{5BCAD085-E8A6-8845-BD4E-CB4CCA059FC4}" type="datetimeFigureOut">
               <a:rPr lang="en-US" smtClean="0"/>
-              <a:t>10/11/2025</a:t>
+              <a:t>10/15/2025</a:t>
             </a:fld>
             <a:endParaRPr lang="en-US"/>
           </a:p>
@@ -3769,7 +3772,7 @@
           <a:p>
             <a:fld id="{5BCAD085-E8A6-8845-BD4E-CB4CCA059FC4}" type="datetimeFigureOut">
               <a:rPr lang="en-US" smtClean="0"/>
-              <a:t>10/11/2025</a:t>
+              <a:t>10/15/2025</a:t>
             </a:fld>
             <a:endParaRPr lang="en-US"/>
           </a:p>
@@ -4017,7 +4020,7 @@
           <a:p>
             <a:fld id="{5BCAD085-E8A6-8845-BD4E-CB4CCA059FC4}" type="datetimeFigureOut">
               <a:rPr lang="en-US" smtClean="0"/>
-              <a:t>10/11/2025</a:t>
+              <a:t>10/15/2025</a:t>
             </a:fld>
             <a:endParaRPr lang="en-US"/>
           </a:p>
@@ -4254,7 +4257,7 @@
           <a:p>
             <a:fld id="{5BCAD085-E8A6-8845-BD4E-CB4CCA059FC4}" type="datetimeFigureOut">
               <a:rPr lang="en-US" smtClean="0"/>
-              <a:t>10/11/2025</a:t>
+              <a:t>10/15/2025</a:t>
             </a:fld>
             <a:endParaRPr lang="en-US"/>
           </a:p>
@@ -4627,7 +4630,7 @@
           <a:p>
             <a:fld id="{5BCAD085-E8A6-8845-BD4E-CB4CCA059FC4}" type="datetimeFigureOut">
               <a:rPr lang="en-US" smtClean="0"/>
-              <a:t>10/11/2025</a:t>
+              <a:t>10/15/2025</a:t>
             </a:fld>
             <a:endParaRPr lang="en-US"/>
           </a:p>
@@ -4745,7 +4748,7 @@
           <a:p>
             <a:fld id="{5BCAD085-E8A6-8845-BD4E-CB4CCA059FC4}" type="datetimeFigureOut">
               <a:rPr lang="en-US" smtClean="0"/>
-              <a:t>10/11/2025</a:t>
+              <a:t>10/15/2025</a:t>
             </a:fld>
             <a:endParaRPr lang="en-US"/>
           </a:p>
@@ -4840,7 +4843,7 @@
           <a:p>
             <a:fld id="{5BCAD085-E8A6-8845-BD4E-CB4CCA059FC4}" type="datetimeFigureOut">
               <a:rPr lang="en-US" smtClean="0"/>
-              <a:t>10/11/2025</a:t>
+              <a:t>10/15/2025</a:t>
             </a:fld>
             <a:endParaRPr lang="en-US"/>
           </a:p>
@@ -5091,7 +5094,7 @@
           <a:p>
             <a:fld id="{5BCAD085-E8A6-8845-BD4E-CB4CCA059FC4}" type="datetimeFigureOut">
               <a:rPr lang="en-US" smtClean="0"/>
-              <a:t>10/11/2025</a:t>
+              <a:t>10/15/2025</a:t>
             </a:fld>
             <a:endParaRPr lang="en-US"/>
           </a:p>
@@ -5378,7 +5381,7 @@
           <a:p>
             <a:fld id="{5BCAD085-E8A6-8845-BD4E-CB4CCA059FC4}" type="datetimeFigureOut">
               <a:rPr lang="en-US" smtClean="0"/>
-              <a:t>10/11/2025</a:t>
+              <a:t>10/15/2025</a:t>
             </a:fld>
             <a:endParaRPr lang="en-US"/>
           </a:p>
@@ -5591,7 +5594,7 @@
           <a:p>
             <a:fld id="{5BCAD085-E8A6-8845-BD4E-CB4CCA059FC4}" type="datetimeFigureOut">
               <a:rPr lang="en-US" smtClean="0"/>
-              <a:t>10/11/2025</a:t>
+              <a:t>10/15/2025</a:t>
             </a:fld>
             <a:endParaRPr lang="en-US"/>
           </a:p>
@@ -6265,9 +6268,45 @@
           <a:lstStyle/>
           <a:p>
             <a:r>
-              <a:rPr lang="en-US" dirty="0"/>
-              <a:t>-</a:t>
-            </a:r>
+              <a:rPr lang="en-US" dirty="0">
+                <a:effectLst/>
+              </a:rPr>
+              <a:t>Figma redesign 1.2</a:t>
+            </a:r>
+          </a:p>
+          <a:p>
+            <a:r>
+              <a:rPr lang="en-US" dirty="0">
+                <a:effectLst/>
+              </a:rPr>
+              <a:t>Competition (Document collaborator)</a:t>
+            </a:r>
+          </a:p>
+          <a:p>
+            <a:r>
+              <a:rPr lang="en-US" dirty="0">
+                <a:effectLst/>
+              </a:rPr>
+              <a:t>Technical Architecture </a:t>
+            </a:r>
+          </a:p>
+          <a:p>
+            <a:r>
+              <a:rPr lang="en-US" dirty="0">
+                <a:effectLst/>
+              </a:rPr>
+              <a:t>Live code</a:t>
+            </a:r>
+          </a:p>
+          <a:p>
+            <a:r>
+              <a:rPr lang="en-GB" dirty="0">
+                <a:effectLst/>
+              </a:rPr>
+              <a:t>AI Progress</a:t>
+            </a:r>
+          </a:p>
+          <a:p>
             <a:endParaRPr lang="en-GB" dirty="0">
               <a:effectLst/>
             </a:endParaRPr>
@@ -6288,6 +6327,308 @@
 </file>
 
 <file path=ppt/slides/slide3.xml><?xml version="1.0" encoding="utf-8"?>
+<p:sld xmlns:a="http://schemas.openxmlformats.org/drawingml/2006/main" xmlns:r="http://schemas.openxmlformats.org/officeDocument/2006/relationships" xmlns:p="http://schemas.openxmlformats.org/presentationml/2006/main">
+  <p:cSld>
+    <p:spTree>
+      <p:nvGrpSpPr>
+        <p:cNvPr id="1" name=""/>
+        <p:cNvGrpSpPr/>
+        <p:nvPr/>
+      </p:nvGrpSpPr>
+      <p:grpSpPr>
+        <a:xfrm>
+          <a:off x="0" y="0"/>
+          <a:ext cx="0" cy="0"/>
+          <a:chOff x="0" y="0"/>
+          <a:chExt cx="0" cy="0"/>
+        </a:xfrm>
+      </p:grpSpPr>
+      <p:sp>
+        <p:nvSpPr>
+          <p:cNvPr id="2" name="Title 1">
+            <a:extLst>
+              <a:ext uri="{FF2B5EF4-FFF2-40B4-BE49-F238E27FC236}">
+                <a16:creationId xmlns:a16="http://schemas.microsoft.com/office/drawing/2014/main" id="{F5521966-B372-23D1-506D-CD32E0DC8955}"/>
+              </a:ext>
+            </a:extLst>
+          </p:cNvPr>
+          <p:cNvSpPr>
+            <a:spLocks noGrp="1"/>
+          </p:cNvSpPr>
+          <p:nvPr>
+            <p:ph type="title"/>
+          </p:nvPr>
+        </p:nvSpPr>
+        <p:spPr>
+          <a:xfrm>
+            <a:off x="689340" y="118538"/>
+            <a:ext cx="7557194" cy="728130"/>
+          </a:xfrm>
+        </p:spPr>
+        <p:txBody>
+          <a:bodyPr/>
+          <a:lstStyle/>
+          <a:p>
+            <a:r>
+              <a:rPr lang="en-US" dirty="0"/>
+              <a:t>1.1 Figma Design</a:t>
+            </a:r>
+            <a:endParaRPr lang="en-GB" dirty="0"/>
+          </a:p>
+        </p:txBody>
+      </p:sp>
+      <p:pic>
+        <p:nvPicPr>
+          <p:cNvPr id="5" name="Content Placeholder 4">
+            <a:extLst>
+              <a:ext uri="{FF2B5EF4-FFF2-40B4-BE49-F238E27FC236}">
+                <a16:creationId xmlns:a16="http://schemas.microsoft.com/office/drawing/2014/main" id="{F42E5467-F1B9-1274-C5F2-5FC7C505B9B7}"/>
+              </a:ext>
+            </a:extLst>
+          </p:cNvPr>
+          <p:cNvPicPr>
+            <a:picLocks noGrp="1" noChangeAspect="1"/>
+          </p:cNvPicPr>
+          <p:nvPr>
+            <p:ph idx="1"/>
+          </p:nvPr>
+        </p:nvPicPr>
+        <p:blipFill>
+          <a:blip r:embed="rId2"/>
+          <a:stretch>
+            <a:fillRect/>
+          </a:stretch>
+        </p:blipFill>
+        <p:spPr>
+          <a:xfrm>
+            <a:off x="0" y="1437217"/>
+            <a:ext cx="9144000" cy="5420783"/>
+          </a:xfrm>
+          <a:prstGeom prst="rect">
+            <a:avLst/>
+          </a:prstGeom>
+        </p:spPr>
+      </p:pic>
+    </p:spTree>
+    <p:extLst>
+      <p:ext uri="{BB962C8B-B14F-4D97-AF65-F5344CB8AC3E}">
+        <p14:creationId xmlns:p14="http://schemas.microsoft.com/office/powerpoint/2010/main" val="3798557013"/>
+      </p:ext>
+    </p:extLst>
+  </p:cSld>
+  <p:clrMapOvr>
+    <a:masterClrMapping/>
+  </p:clrMapOvr>
+</p:sld>
+</file>
+
+<file path=ppt/slides/slide4.xml><?xml version="1.0" encoding="utf-8"?>
+<p:sld xmlns:a="http://schemas.openxmlformats.org/drawingml/2006/main" xmlns:r="http://schemas.openxmlformats.org/officeDocument/2006/relationships" xmlns:p="http://schemas.openxmlformats.org/presentationml/2006/main">
+  <p:cSld>
+    <p:spTree>
+      <p:nvGrpSpPr>
+        <p:cNvPr id="1" name="">
+          <a:extLst>
+            <a:ext uri="{FF2B5EF4-FFF2-40B4-BE49-F238E27FC236}">
+              <a16:creationId xmlns:a16="http://schemas.microsoft.com/office/drawing/2014/main" id="{64B68FB4-BC8E-3D73-9416-0EAB4644C368}"/>
+            </a:ext>
+          </a:extLst>
+        </p:cNvPr>
+        <p:cNvGrpSpPr/>
+        <p:nvPr/>
+      </p:nvGrpSpPr>
+      <p:grpSpPr>
+        <a:xfrm>
+          <a:off x="0" y="0"/>
+          <a:ext cx="0" cy="0"/>
+          <a:chOff x="0" y="0"/>
+          <a:chExt cx="0" cy="0"/>
+        </a:xfrm>
+      </p:grpSpPr>
+      <p:sp>
+        <p:nvSpPr>
+          <p:cNvPr id="2" name="Title 1">
+            <a:extLst>
+              <a:ext uri="{FF2B5EF4-FFF2-40B4-BE49-F238E27FC236}">
+                <a16:creationId xmlns:a16="http://schemas.microsoft.com/office/drawing/2014/main" id="{EA08DFE8-8F90-6CE3-DC04-8563898D1E21}"/>
+              </a:ext>
+            </a:extLst>
+          </p:cNvPr>
+          <p:cNvSpPr>
+            <a:spLocks noGrp="1"/>
+          </p:cNvSpPr>
+          <p:nvPr>
+            <p:ph type="title"/>
+          </p:nvPr>
+        </p:nvSpPr>
+        <p:spPr>
+          <a:xfrm>
+            <a:off x="689340" y="118538"/>
+            <a:ext cx="7557194" cy="728130"/>
+          </a:xfrm>
+        </p:spPr>
+        <p:txBody>
+          <a:bodyPr>
+            <a:normAutofit fontScale="90000"/>
+          </a:bodyPr>
+          <a:lstStyle/>
+          <a:p>
+            <a:r>
+              <a:rPr lang="en-US" dirty="0"/>
+              <a:t>1.2 Figma Design (Logged out)</a:t>
+            </a:r>
+            <a:endParaRPr lang="en-GB" dirty="0"/>
+          </a:p>
+        </p:txBody>
+      </p:sp>
+      <p:pic>
+        <p:nvPicPr>
+          <p:cNvPr id="5" name="Content Placeholder 4">
+            <a:extLst>
+              <a:ext uri="{FF2B5EF4-FFF2-40B4-BE49-F238E27FC236}">
+                <a16:creationId xmlns:a16="http://schemas.microsoft.com/office/drawing/2014/main" id="{D90D5316-0741-022C-C108-A8DDF38EF921}"/>
+              </a:ext>
+            </a:extLst>
+          </p:cNvPr>
+          <p:cNvPicPr>
+            <a:picLocks noGrp="1" noChangeAspect="1"/>
+          </p:cNvPicPr>
+          <p:nvPr>
+            <p:ph idx="1"/>
+          </p:nvPr>
+        </p:nvPicPr>
+        <p:blipFill>
+          <a:blip r:embed="rId2"/>
+          <a:srcRect/>
+          <a:stretch/>
+        </p:blipFill>
+        <p:spPr>
+          <a:xfrm>
+            <a:off x="0" y="1437217"/>
+            <a:ext cx="9144000" cy="5420783"/>
+          </a:xfrm>
+          <a:prstGeom prst="rect">
+            <a:avLst/>
+          </a:prstGeom>
+        </p:spPr>
+      </p:pic>
+    </p:spTree>
+    <p:extLst>
+      <p:ext uri="{BB962C8B-B14F-4D97-AF65-F5344CB8AC3E}">
+        <p14:creationId xmlns:p14="http://schemas.microsoft.com/office/powerpoint/2010/main" val="1599909334"/>
+      </p:ext>
+    </p:extLst>
+  </p:cSld>
+  <p:clrMapOvr>
+    <a:masterClrMapping/>
+  </p:clrMapOvr>
+</p:sld>
+</file>
+
+<file path=ppt/slides/slide5.xml><?xml version="1.0" encoding="utf-8"?>
+<p:sld xmlns:a="http://schemas.openxmlformats.org/drawingml/2006/main" xmlns:r="http://schemas.openxmlformats.org/officeDocument/2006/relationships" xmlns:p="http://schemas.openxmlformats.org/presentationml/2006/main">
+  <p:cSld>
+    <p:spTree>
+      <p:nvGrpSpPr>
+        <p:cNvPr id="1" name="">
+          <a:extLst>
+            <a:ext uri="{FF2B5EF4-FFF2-40B4-BE49-F238E27FC236}">
+              <a16:creationId xmlns:a16="http://schemas.microsoft.com/office/drawing/2014/main" id="{6C6B11B9-E6A0-6FA6-14D5-99BA2625D4B9}"/>
+            </a:ext>
+          </a:extLst>
+        </p:cNvPr>
+        <p:cNvGrpSpPr/>
+        <p:nvPr/>
+      </p:nvGrpSpPr>
+      <p:grpSpPr>
+        <a:xfrm>
+          <a:off x="0" y="0"/>
+          <a:ext cx="0" cy="0"/>
+          <a:chOff x="0" y="0"/>
+          <a:chExt cx="0" cy="0"/>
+        </a:xfrm>
+      </p:grpSpPr>
+      <p:sp>
+        <p:nvSpPr>
+          <p:cNvPr id="2" name="Title 1">
+            <a:extLst>
+              <a:ext uri="{FF2B5EF4-FFF2-40B4-BE49-F238E27FC236}">
+                <a16:creationId xmlns:a16="http://schemas.microsoft.com/office/drawing/2014/main" id="{1C987C9D-D15E-9416-EA7A-6BFA8456C0D6}"/>
+              </a:ext>
+            </a:extLst>
+          </p:cNvPr>
+          <p:cNvSpPr>
+            <a:spLocks noGrp="1"/>
+          </p:cNvSpPr>
+          <p:nvPr>
+            <p:ph type="title"/>
+          </p:nvPr>
+        </p:nvSpPr>
+        <p:spPr>
+          <a:xfrm>
+            <a:off x="689340" y="118538"/>
+            <a:ext cx="7557194" cy="728130"/>
+          </a:xfrm>
+        </p:spPr>
+        <p:txBody>
+          <a:bodyPr>
+            <a:normAutofit/>
+          </a:bodyPr>
+          <a:lstStyle/>
+          <a:p>
+            <a:r>
+              <a:rPr lang="en-US" dirty="0"/>
+              <a:t>1.2 Figma Design (Logged in)</a:t>
+            </a:r>
+            <a:endParaRPr lang="en-GB" dirty="0"/>
+          </a:p>
+        </p:txBody>
+      </p:sp>
+      <p:pic>
+        <p:nvPicPr>
+          <p:cNvPr id="5" name="Content Placeholder 4">
+            <a:extLst>
+              <a:ext uri="{FF2B5EF4-FFF2-40B4-BE49-F238E27FC236}">
+                <a16:creationId xmlns:a16="http://schemas.microsoft.com/office/drawing/2014/main" id="{F164AEF4-C37E-9CAE-B5EA-65D02E3A14B6}"/>
+              </a:ext>
+            </a:extLst>
+          </p:cNvPr>
+          <p:cNvPicPr>
+            <a:picLocks noGrp="1" noChangeAspect="1"/>
+          </p:cNvPicPr>
+          <p:nvPr>
+            <p:ph idx="1"/>
+          </p:nvPr>
+        </p:nvPicPr>
+        <p:blipFill>
+          <a:blip r:embed="rId2"/>
+          <a:srcRect/>
+          <a:stretch/>
+        </p:blipFill>
+        <p:spPr>
+          <a:xfrm>
+            <a:off x="0" y="1437217"/>
+            <a:ext cx="9144000" cy="5420783"/>
+          </a:xfrm>
+          <a:prstGeom prst="rect">
+            <a:avLst/>
+          </a:prstGeom>
+        </p:spPr>
+      </p:pic>
+    </p:spTree>
+    <p:extLst>
+      <p:ext uri="{BB962C8B-B14F-4D97-AF65-F5344CB8AC3E}">
+        <p14:creationId xmlns:p14="http://schemas.microsoft.com/office/powerpoint/2010/main" val="1750080713"/>
+      </p:ext>
+    </p:extLst>
+  </p:cSld>
+  <p:clrMapOvr>
+    <a:masterClrMapping/>
+  </p:clrMapOvr>
+</p:sld>
+</file>
+
+<file path=ppt/slides/slide6.xml><?xml version="1.0" encoding="utf-8"?>
 <p:sld xmlns:a="http://schemas.openxmlformats.org/drawingml/2006/main" xmlns:r="http://schemas.openxmlformats.org/officeDocument/2006/relationships" xmlns:p="http://schemas.openxmlformats.org/presentationml/2006/main">
   <p:cSld>
     <p:spTree>

</xml_diff>